<commit_message>
added dislike chatroom for the role reversal. #7
</commit_message>
<xml_diff>
--- a/public/js/tasks/social_media/media/Social_media_task_instructions_07_08_2022.pptx
+++ b/public/js/tasks/social_media/media/Social_media_task_instructions_07_08_2022.pptx
@@ -5,7 +5,7 @@
     <p:sldMasterId id="2147483660" r:id="rId1"/>
   </p:sldMasterIdLst>
   <p:notesMasterIdLst>
-    <p:notesMasterId r:id="rId34"/>
+    <p:notesMasterId r:id="rId35"/>
   </p:notesMasterIdLst>
   <p:sldIdLst>
     <p:sldId id="498" r:id="rId2"/>
@@ -38,8 +38,9 @@
     <p:sldId id="530" r:id="rId29"/>
     <p:sldId id="538" r:id="rId30"/>
     <p:sldId id="540" r:id="rId31"/>
-    <p:sldId id="541" r:id="rId32"/>
-    <p:sldId id="545" r:id="rId33"/>
+    <p:sldId id="547" r:id="rId32"/>
+    <p:sldId id="541" r:id="rId33"/>
+    <p:sldId id="545" r:id="rId34"/>
   </p:sldIdLst>
   <p:sldSz cx="12192000" cy="6858000"/>
   <p:notesSz cx="6858000" cy="9144000"/>
@@ -177,6 +178,7 @@
           <p14:sldIdLst>
             <p14:sldId id="538"/>
             <p14:sldId id="540"/>
+            <p14:sldId id="547"/>
             <p14:sldId id="541"/>
           </p14:sldIdLst>
         </p14:section>
@@ -287,7 +289,7 @@
           <a:p>
             <a:fld id="{5ACDFB13-8C7E-2148-B293-047F9641DD71}" type="datetimeFigureOut">
               <a:rPr lang="en-US" smtClean="0"/>
-              <a:t>7/8/22</a:t>
+              <a:t>7/12/22</a:t>
             </a:fld>
             <a:endParaRPr lang="en-US" dirty="0"/>
           </a:p>
@@ -2992,7 +2994,7 @@
     </p:spTree>
     <p:extLst>
       <p:ext uri="{BB962C8B-B14F-4D97-AF65-F5344CB8AC3E}">
-        <p14:creationId xmlns:p14="http://schemas.microsoft.com/office/powerpoint/2010/main" val="3223258865"/>
+        <p14:creationId xmlns:p14="http://schemas.microsoft.com/office/powerpoint/2010/main" val="1643130909"/>
       </p:ext>
     </p:extLst>
   </p:cSld>
@@ -3051,14 +3053,6 @@
           <a:bodyPr/>
           <a:lstStyle/>
           <a:p>
-            <a:r>
-              <a:rPr lang="en-US" dirty="0"/>
-              <a:t>Add screenshots of an X and an O</a:t>
-            </a:r>
-            <a:r>
-              <a:rPr lang="en-US" baseline="0" dirty="0"/>
-              <a:t> screen – like a timeline of screenshots.</a:t>
-            </a:r>
             <a:endParaRPr lang="en-US" dirty="0"/>
           </a:p>
         </p:txBody>
@@ -3081,6 +3075,103 @@
             <a:fld id="{BCAE12D7-AE97-9243-8341-9A20FCA5A307}" type="slidenum">
               <a:rPr lang="en-US" smtClean="0"/>
               <a:t>32</a:t>
+            </a:fld>
+            <a:endParaRPr lang="en-US"/>
+          </a:p>
+        </p:txBody>
+      </p:sp>
+    </p:spTree>
+    <p:extLst>
+      <p:ext uri="{BB962C8B-B14F-4D97-AF65-F5344CB8AC3E}">
+        <p14:creationId xmlns:p14="http://schemas.microsoft.com/office/powerpoint/2010/main" val="3223258865"/>
+      </p:ext>
+    </p:extLst>
+  </p:cSld>
+  <p:clrMapOvr>
+    <a:masterClrMapping/>
+  </p:clrMapOvr>
+</p:notes>
+</file>
+
+<file path=ppt/notesSlides/notesSlide33.xml><?xml version="1.0" encoding="utf-8"?>
+<p:notes xmlns:a="http://schemas.openxmlformats.org/drawingml/2006/main" xmlns:r="http://schemas.openxmlformats.org/officeDocument/2006/relationships" xmlns:p="http://schemas.openxmlformats.org/presentationml/2006/main">
+  <p:cSld>
+    <p:spTree>
+      <p:nvGrpSpPr>
+        <p:cNvPr id="1" name=""/>
+        <p:cNvGrpSpPr/>
+        <p:nvPr/>
+      </p:nvGrpSpPr>
+      <p:grpSpPr>
+        <a:xfrm>
+          <a:off x="0" y="0"/>
+          <a:ext cx="0" cy="0"/>
+          <a:chOff x="0" y="0"/>
+          <a:chExt cx="0" cy="0"/>
+        </a:xfrm>
+      </p:grpSpPr>
+      <p:sp>
+        <p:nvSpPr>
+          <p:cNvPr id="2" name="Slide Image Placeholder 1"/>
+          <p:cNvSpPr>
+            <a:spLocks noGrp="1" noRot="1" noChangeAspect="1"/>
+          </p:cNvSpPr>
+          <p:nvPr>
+            <p:ph type="sldImg"/>
+          </p:nvPr>
+        </p:nvSpPr>
+        <p:spPr>
+          <a:xfrm>
+            <a:off x="381000" y="685800"/>
+            <a:ext cx="6096000" cy="3429000"/>
+          </a:xfrm>
+        </p:spPr>
+      </p:sp>
+      <p:sp>
+        <p:nvSpPr>
+          <p:cNvPr id="3" name="Notes Placeholder 2"/>
+          <p:cNvSpPr>
+            <a:spLocks noGrp="1"/>
+          </p:cNvSpPr>
+          <p:nvPr>
+            <p:ph type="body" idx="1"/>
+          </p:nvPr>
+        </p:nvSpPr>
+        <p:spPr/>
+        <p:txBody>
+          <a:bodyPr/>
+          <a:lstStyle/>
+          <a:p>
+            <a:r>
+              <a:rPr lang="en-US" dirty="0"/>
+              <a:t>Add screenshots of an X and an O</a:t>
+            </a:r>
+            <a:r>
+              <a:rPr lang="en-US" baseline="0" dirty="0"/>
+              <a:t> screen – like a timeline of screenshots.</a:t>
+            </a:r>
+            <a:endParaRPr lang="en-US" dirty="0"/>
+          </a:p>
+        </p:txBody>
+      </p:sp>
+      <p:sp>
+        <p:nvSpPr>
+          <p:cNvPr id="4" name="Slide Number Placeholder 3"/>
+          <p:cNvSpPr>
+            <a:spLocks noGrp="1"/>
+          </p:cNvSpPr>
+          <p:nvPr>
+            <p:ph type="sldNum" sz="quarter" idx="10"/>
+          </p:nvPr>
+        </p:nvSpPr>
+        <p:spPr/>
+        <p:txBody>
+          <a:bodyPr/>
+          <a:lstStyle/>
+          <a:p>
+            <a:fld id="{BCAE12D7-AE97-9243-8341-9A20FCA5A307}" type="slidenum">
+              <a:rPr lang="en-US" smtClean="0"/>
+              <a:t>33</a:t>
             </a:fld>
             <a:endParaRPr lang="en-US"/>
           </a:p>
@@ -3855,7 +3946,7 @@
           <a:p>
             <a:fld id="{E69A4D3A-6EF8-7448-AC6F-AD52FEDAA6A8}" type="datetimeFigureOut">
               <a:rPr lang="en-US" smtClean="0"/>
-              <a:t>7/8/22</a:t>
+              <a:t>7/12/22</a:t>
             </a:fld>
             <a:endParaRPr lang="en-US" dirty="0"/>
           </a:p>
@@ -4023,7 +4114,7 @@
           <a:p>
             <a:fld id="{E69A4D3A-6EF8-7448-AC6F-AD52FEDAA6A8}" type="datetimeFigureOut">
               <a:rPr lang="en-US" smtClean="0"/>
-              <a:t>7/8/22</a:t>
+              <a:t>7/12/22</a:t>
             </a:fld>
             <a:endParaRPr lang="en-US" dirty="0"/>
           </a:p>
@@ -4201,7 +4292,7 @@
           <a:p>
             <a:fld id="{E69A4D3A-6EF8-7448-AC6F-AD52FEDAA6A8}" type="datetimeFigureOut">
               <a:rPr lang="en-US" smtClean="0"/>
-              <a:t>7/8/22</a:t>
+              <a:t>7/12/22</a:t>
             </a:fld>
             <a:endParaRPr lang="en-US" dirty="0"/>
           </a:p>
@@ -4369,7 +4460,7 @@
           <a:p>
             <a:fld id="{E69A4D3A-6EF8-7448-AC6F-AD52FEDAA6A8}" type="datetimeFigureOut">
               <a:rPr lang="en-US" smtClean="0"/>
-              <a:t>7/8/22</a:t>
+              <a:t>7/12/22</a:t>
             </a:fld>
             <a:endParaRPr lang="en-US" dirty="0"/>
           </a:p>
@@ -4614,7 +4705,7 @@
           <a:p>
             <a:fld id="{E69A4D3A-6EF8-7448-AC6F-AD52FEDAA6A8}" type="datetimeFigureOut">
               <a:rPr lang="en-US" smtClean="0"/>
-              <a:t>7/8/22</a:t>
+              <a:t>7/12/22</a:t>
             </a:fld>
             <a:endParaRPr lang="en-US" dirty="0"/>
           </a:p>
@@ -4899,7 +4990,7 @@
           <a:p>
             <a:fld id="{E69A4D3A-6EF8-7448-AC6F-AD52FEDAA6A8}" type="datetimeFigureOut">
               <a:rPr lang="en-US" smtClean="0"/>
-              <a:t>7/8/22</a:t>
+              <a:t>7/12/22</a:t>
             </a:fld>
             <a:endParaRPr lang="en-US" dirty="0"/>
           </a:p>
@@ -5318,7 +5409,7 @@
           <a:p>
             <a:fld id="{E69A4D3A-6EF8-7448-AC6F-AD52FEDAA6A8}" type="datetimeFigureOut">
               <a:rPr lang="en-US" smtClean="0"/>
-              <a:t>7/8/22</a:t>
+              <a:t>7/12/22</a:t>
             </a:fld>
             <a:endParaRPr lang="en-US" dirty="0"/>
           </a:p>
@@ -5435,7 +5526,7 @@
           <a:p>
             <a:fld id="{E69A4D3A-6EF8-7448-AC6F-AD52FEDAA6A8}" type="datetimeFigureOut">
               <a:rPr lang="en-US" smtClean="0"/>
-              <a:t>7/8/22</a:t>
+              <a:t>7/12/22</a:t>
             </a:fld>
             <a:endParaRPr lang="en-US" dirty="0"/>
           </a:p>
@@ -5530,7 +5621,7 @@
           <a:p>
             <a:fld id="{E69A4D3A-6EF8-7448-AC6F-AD52FEDAA6A8}" type="datetimeFigureOut">
               <a:rPr lang="en-US" smtClean="0"/>
-              <a:t>7/8/22</a:t>
+              <a:t>7/12/22</a:t>
             </a:fld>
             <a:endParaRPr lang="en-US" dirty="0"/>
           </a:p>
@@ -5805,7 +5896,7 @@
           <a:p>
             <a:fld id="{E69A4D3A-6EF8-7448-AC6F-AD52FEDAA6A8}" type="datetimeFigureOut">
               <a:rPr lang="en-US" smtClean="0"/>
-              <a:t>7/8/22</a:t>
+              <a:t>7/12/22</a:t>
             </a:fld>
             <a:endParaRPr lang="en-US" dirty="0"/>
           </a:p>
@@ -6060,7 +6151,7 @@
           <a:p>
             <a:fld id="{E69A4D3A-6EF8-7448-AC6F-AD52FEDAA6A8}" type="datetimeFigureOut">
               <a:rPr lang="en-US" smtClean="0"/>
-              <a:t>7/8/22</a:t>
+              <a:t>7/12/22</a:t>
             </a:fld>
             <a:endParaRPr lang="en-US" dirty="0"/>
           </a:p>
@@ -6274,7 +6365,7 @@
           <a:p>
             <a:fld id="{E69A4D3A-6EF8-7448-AC6F-AD52FEDAA6A8}" type="datetimeFigureOut">
               <a:rPr lang="en-US" smtClean="0"/>
-              <a:t>7/8/22</a:t>
+              <a:t>7/12/22</a:t>
             </a:fld>
             <a:endParaRPr lang="en-US" dirty="0"/>
           </a:p>
@@ -13960,38 +14051,6 @@
           <a:chExt cx="0" cy="0"/>
         </a:xfrm>
       </p:grpSpPr>
-      <p:pic>
-        <p:nvPicPr>
-          <p:cNvPr id="16" name="Picture 15">
-            <a:extLst>
-              <a:ext uri="{FF2B5EF4-FFF2-40B4-BE49-F238E27FC236}">
-                <a16:creationId xmlns:a16="http://schemas.microsoft.com/office/drawing/2014/main" id="{70518048-CC5E-D142-85BA-F7C92DACC9E9}"/>
-              </a:ext>
-            </a:extLst>
-          </p:cNvPr>
-          <p:cNvPicPr>
-            <a:picLocks noChangeAspect="1"/>
-          </p:cNvPicPr>
-          <p:nvPr/>
-        </p:nvPicPr>
-        <p:blipFill rotWithShape="1">
-          <a:blip r:embed="rId3"/>
-          <a:srcRect l="5102" t="14169" r="4526" b="6636"/>
-          <a:stretch/>
-        </p:blipFill>
-        <p:spPr>
-          <a:xfrm>
-            <a:off x="3237400" y="1854981"/>
-            <a:ext cx="5717199" cy="4016353"/>
-          </a:xfrm>
-          <a:prstGeom prst="rect">
-            <a:avLst/>
-          </a:prstGeom>
-          <a:ln>
-            <a:noFill/>
-          </a:ln>
-        </p:spPr>
-      </p:pic>
       <p:sp>
         <p:nvSpPr>
           <p:cNvPr id="3" name="Content Placeholder 2"/>
@@ -14362,6 +14421,282 @@
       </p:sp>
       <p:sp>
         <p:nvSpPr>
+          <p:cNvPr id="11" name="Subtitle 8">
+            <a:extLst>
+              <a:ext uri="{FF2B5EF4-FFF2-40B4-BE49-F238E27FC236}">
+                <a16:creationId xmlns:a16="http://schemas.microsoft.com/office/drawing/2014/main" id="{1FEB19E2-FC1A-954B-BAB0-7D1DAA43A60F}"/>
+              </a:ext>
+            </a:extLst>
+          </p:cNvPr>
+          <p:cNvSpPr txBox="1">
+            <a:spLocks/>
+          </p:cNvSpPr>
+          <p:nvPr/>
+        </p:nvSpPr>
+        <p:spPr>
+          <a:xfrm>
+            <a:off x="1518826" y="6073844"/>
+            <a:ext cx="1532830" cy="801636"/>
+          </a:xfrm>
+          <a:prstGeom prst="rect">
+            <a:avLst/>
+          </a:prstGeom>
+        </p:spPr>
+        <p:txBody>
+          <a:bodyPr vert="horz" lIns="91440" tIns="45720" rIns="91440" bIns="45720" rtlCol="0">
+            <a:normAutofit/>
+          </a:bodyPr>
+          <a:lstStyle>
+            <a:lvl1pPr marL="0" indent="0" algn="ctr" defTabSz="914400" rtl="0" eaLnBrk="1" latinLnBrk="0" hangingPunct="1">
+              <a:spcBef>
+                <a:spcPct val="20000"/>
+              </a:spcBef>
+              <a:buFont typeface="Arial" pitchFamily="34" charset="0"/>
+              <a:buNone/>
+              <a:defRPr sz="3200" kern="1200">
+                <a:solidFill>
+                  <a:schemeClr val="tx1">
+                    <a:tint val="75000"/>
+                  </a:schemeClr>
+                </a:solidFill>
+                <a:latin typeface="+mn-lt"/>
+                <a:ea typeface="+mn-ea"/>
+                <a:cs typeface="+mn-cs"/>
+              </a:defRPr>
+            </a:lvl1pPr>
+            <a:lvl2pPr marL="457200" indent="0" algn="ctr" defTabSz="914400" rtl="0" eaLnBrk="1" latinLnBrk="0" hangingPunct="1">
+              <a:spcBef>
+                <a:spcPct val="20000"/>
+              </a:spcBef>
+              <a:buFont typeface="Arial" pitchFamily="34" charset="0"/>
+              <a:buNone/>
+              <a:defRPr sz="2800" kern="1200">
+                <a:solidFill>
+                  <a:schemeClr val="tx1">
+                    <a:tint val="75000"/>
+                  </a:schemeClr>
+                </a:solidFill>
+                <a:latin typeface="+mn-lt"/>
+                <a:ea typeface="+mn-ea"/>
+                <a:cs typeface="+mn-cs"/>
+              </a:defRPr>
+            </a:lvl2pPr>
+            <a:lvl3pPr marL="914400" indent="0" algn="ctr" defTabSz="914400" rtl="0" eaLnBrk="1" latinLnBrk="0" hangingPunct="1">
+              <a:spcBef>
+                <a:spcPct val="20000"/>
+              </a:spcBef>
+              <a:buFont typeface="Arial" pitchFamily="34" charset="0"/>
+              <a:buNone/>
+              <a:defRPr sz="2400" kern="1200">
+                <a:solidFill>
+                  <a:schemeClr val="tx1">
+                    <a:tint val="75000"/>
+                  </a:schemeClr>
+                </a:solidFill>
+                <a:latin typeface="+mn-lt"/>
+                <a:ea typeface="+mn-ea"/>
+                <a:cs typeface="+mn-cs"/>
+              </a:defRPr>
+            </a:lvl3pPr>
+            <a:lvl4pPr marL="1371600" indent="0" algn="ctr" defTabSz="914400" rtl="0" eaLnBrk="1" latinLnBrk="0" hangingPunct="1">
+              <a:spcBef>
+                <a:spcPct val="20000"/>
+              </a:spcBef>
+              <a:buFont typeface="Arial" pitchFamily="34" charset="0"/>
+              <a:buNone/>
+              <a:defRPr sz="2000" kern="1200">
+                <a:solidFill>
+                  <a:schemeClr val="tx1">
+                    <a:tint val="75000"/>
+                  </a:schemeClr>
+                </a:solidFill>
+                <a:latin typeface="+mn-lt"/>
+                <a:ea typeface="+mn-ea"/>
+                <a:cs typeface="+mn-cs"/>
+              </a:defRPr>
+            </a:lvl4pPr>
+            <a:lvl5pPr marL="1828800" indent="0" algn="ctr" defTabSz="914400" rtl="0" eaLnBrk="1" latinLnBrk="0" hangingPunct="1">
+              <a:spcBef>
+                <a:spcPct val="20000"/>
+              </a:spcBef>
+              <a:buFont typeface="Arial" pitchFamily="34" charset="0"/>
+              <a:buNone/>
+              <a:defRPr sz="2000" kern="1200">
+                <a:solidFill>
+                  <a:schemeClr val="tx1">
+                    <a:tint val="75000"/>
+                  </a:schemeClr>
+                </a:solidFill>
+                <a:latin typeface="+mn-lt"/>
+                <a:ea typeface="+mn-ea"/>
+                <a:cs typeface="+mn-cs"/>
+              </a:defRPr>
+            </a:lvl5pPr>
+            <a:lvl6pPr marL="2286000" indent="0" algn="ctr" defTabSz="914400" rtl="0" eaLnBrk="1" latinLnBrk="0" hangingPunct="1">
+              <a:spcBef>
+                <a:spcPct val="20000"/>
+              </a:spcBef>
+              <a:buFont typeface="Arial" pitchFamily="34" charset="0"/>
+              <a:buNone/>
+              <a:defRPr sz="2000" kern="1200">
+                <a:solidFill>
+                  <a:schemeClr val="tx1">
+                    <a:tint val="75000"/>
+                  </a:schemeClr>
+                </a:solidFill>
+                <a:latin typeface="+mn-lt"/>
+                <a:ea typeface="+mn-ea"/>
+                <a:cs typeface="+mn-cs"/>
+              </a:defRPr>
+            </a:lvl6pPr>
+            <a:lvl7pPr marL="2743200" indent="0" algn="ctr" defTabSz="914400" rtl="0" eaLnBrk="1" latinLnBrk="0" hangingPunct="1">
+              <a:spcBef>
+                <a:spcPct val="20000"/>
+              </a:spcBef>
+              <a:buFont typeface="Arial" pitchFamily="34" charset="0"/>
+              <a:buNone/>
+              <a:defRPr sz="2000" kern="1200">
+                <a:solidFill>
+                  <a:schemeClr val="tx1">
+                    <a:tint val="75000"/>
+                  </a:schemeClr>
+                </a:solidFill>
+                <a:latin typeface="+mn-lt"/>
+                <a:ea typeface="+mn-ea"/>
+                <a:cs typeface="+mn-cs"/>
+              </a:defRPr>
+            </a:lvl7pPr>
+            <a:lvl8pPr marL="3200400" indent="0" algn="ctr" defTabSz="914400" rtl="0" eaLnBrk="1" latinLnBrk="0" hangingPunct="1">
+              <a:spcBef>
+                <a:spcPct val="20000"/>
+              </a:spcBef>
+              <a:buFont typeface="Arial" pitchFamily="34" charset="0"/>
+              <a:buNone/>
+              <a:defRPr sz="2000" kern="1200">
+                <a:solidFill>
+                  <a:schemeClr val="tx1">
+                    <a:tint val="75000"/>
+                  </a:schemeClr>
+                </a:solidFill>
+                <a:latin typeface="+mn-lt"/>
+                <a:ea typeface="+mn-ea"/>
+                <a:cs typeface="+mn-cs"/>
+              </a:defRPr>
+            </a:lvl8pPr>
+            <a:lvl9pPr marL="3657600" indent="0" algn="ctr" defTabSz="914400" rtl="0" eaLnBrk="1" latinLnBrk="0" hangingPunct="1">
+              <a:spcBef>
+                <a:spcPct val="20000"/>
+              </a:spcBef>
+              <a:buFont typeface="Arial" pitchFamily="34" charset="0"/>
+              <a:buNone/>
+              <a:defRPr sz="2000" kern="1200">
+                <a:solidFill>
+                  <a:schemeClr val="tx1">
+                    <a:tint val="75000"/>
+                  </a:schemeClr>
+                </a:solidFill>
+                <a:latin typeface="+mn-lt"/>
+                <a:ea typeface="+mn-ea"/>
+                <a:cs typeface="+mn-cs"/>
+              </a:defRPr>
+            </a:lvl9pPr>
+          </a:lstStyle>
+          <a:p>
+            <a:r>
+              <a:rPr lang="en-US" sz="1600" dirty="0">
+                <a:solidFill>
+                  <a:schemeClr val="tx1"/>
+                </a:solidFill>
+              </a:rPr>
+              <a:t>LEFT</a:t>
+            </a:r>
+          </a:p>
+        </p:txBody>
+      </p:sp>
+      <p:sp>
+        <p:nvSpPr>
+          <p:cNvPr id="14" name="Right Arrow 13">
+            <a:extLst>
+              <a:ext uri="{FF2B5EF4-FFF2-40B4-BE49-F238E27FC236}">
+                <a16:creationId xmlns:a16="http://schemas.microsoft.com/office/drawing/2014/main" id="{97214DF3-483F-0D4D-99B9-A4D1F523D806}"/>
+              </a:ext>
+            </a:extLst>
+          </p:cNvPr>
+          <p:cNvSpPr/>
+          <p:nvPr/>
+        </p:nvSpPr>
+        <p:spPr>
+          <a:xfrm rot="10800000">
+            <a:off x="1902125" y="6391827"/>
+            <a:ext cx="640200" cy="289763"/>
+          </a:xfrm>
+          <a:prstGeom prst="rightArrow">
+            <a:avLst/>
+          </a:prstGeom>
+          <a:solidFill>
+            <a:schemeClr val="tx1"/>
+          </a:solidFill>
+          <a:ln>
+            <a:noFill/>
+          </a:ln>
+        </p:spPr>
+        <p:style>
+          <a:lnRef idx="1">
+            <a:schemeClr val="accent1"/>
+          </a:lnRef>
+          <a:fillRef idx="3">
+            <a:schemeClr val="accent1"/>
+          </a:fillRef>
+          <a:effectRef idx="2">
+            <a:schemeClr val="accent1"/>
+          </a:effectRef>
+          <a:fontRef idx="minor">
+            <a:schemeClr val="lt1"/>
+          </a:fontRef>
+        </p:style>
+        <p:txBody>
+          <a:bodyPr rtlCol="0" anchor="ctr"/>
+          <a:lstStyle/>
+          <a:p>
+            <a:pPr algn="ctr"/>
+            <a:endParaRPr lang="en-US"/>
+          </a:p>
+        </p:txBody>
+      </p:sp>
+      <p:pic>
+        <p:nvPicPr>
+          <p:cNvPr id="17" name="Picture 16">
+            <a:extLst>
+              <a:ext uri="{FF2B5EF4-FFF2-40B4-BE49-F238E27FC236}">
+                <a16:creationId xmlns:a16="http://schemas.microsoft.com/office/drawing/2014/main" id="{21E2B9E5-75A2-884C-B2B2-007A779680E2}"/>
+              </a:ext>
+            </a:extLst>
+          </p:cNvPr>
+          <p:cNvPicPr>
+            <a:picLocks noChangeAspect="1"/>
+          </p:cNvPicPr>
+          <p:nvPr/>
+        </p:nvPicPr>
+        <p:blipFill rotWithShape="1">
+          <a:blip r:embed="rId3"/>
+          <a:srcRect l="4493" t="13958" r="4356" b="6685"/>
+          <a:stretch/>
+        </p:blipFill>
+        <p:spPr>
+          <a:xfrm>
+            <a:off x="3459859" y="1929008"/>
+            <a:ext cx="5272281" cy="3915102"/>
+          </a:xfrm>
+          <a:prstGeom prst="rect">
+            <a:avLst/>
+          </a:prstGeom>
+          <a:ln>
+            <a:noFill/>
+          </a:ln>
+        </p:spPr>
+      </p:pic>
+      <p:sp>
+        <p:nvSpPr>
           <p:cNvPr id="10" name="Rectangle 9">
             <a:extLst>
               <a:ext uri="{FF2B5EF4-FFF2-40B4-BE49-F238E27FC236}">
@@ -14374,7 +14709,7 @@
         </p:nvSpPr>
         <p:spPr>
           <a:xfrm>
-            <a:off x="4729798" y="1810486"/>
+            <a:off x="4831753" y="1737357"/>
             <a:ext cx="4482365" cy="4397444"/>
           </a:xfrm>
           <a:prstGeom prst="rect">
@@ -14451,250 +14786,6 @@
             <a:schemeClr val="accent1"/>
           </a:fillRef>
           <a:effectRef idx="0">
-            <a:schemeClr val="accent1"/>
-          </a:effectRef>
-          <a:fontRef idx="minor">
-            <a:schemeClr val="lt1"/>
-          </a:fontRef>
-        </p:style>
-        <p:txBody>
-          <a:bodyPr rtlCol="0" anchor="ctr"/>
-          <a:lstStyle/>
-          <a:p>
-            <a:pPr algn="ctr"/>
-            <a:endParaRPr lang="en-US"/>
-          </a:p>
-        </p:txBody>
-      </p:sp>
-      <p:sp>
-        <p:nvSpPr>
-          <p:cNvPr id="11" name="Subtitle 8">
-            <a:extLst>
-              <a:ext uri="{FF2B5EF4-FFF2-40B4-BE49-F238E27FC236}">
-                <a16:creationId xmlns:a16="http://schemas.microsoft.com/office/drawing/2014/main" id="{1FEB19E2-FC1A-954B-BAB0-7D1DAA43A60F}"/>
-              </a:ext>
-            </a:extLst>
-          </p:cNvPr>
-          <p:cNvSpPr txBox="1">
-            <a:spLocks/>
-          </p:cNvSpPr>
-          <p:nvPr/>
-        </p:nvSpPr>
-        <p:spPr>
-          <a:xfrm>
-            <a:off x="1518826" y="6073844"/>
-            <a:ext cx="1532830" cy="801636"/>
-          </a:xfrm>
-          <a:prstGeom prst="rect">
-            <a:avLst/>
-          </a:prstGeom>
-        </p:spPr>
-        <p:txBody>
-          <a:bodyPr vert="horz" lIns="91440" tIns="45720" rIns="91440" bIns="45720" rtlCol="0">
-            <a:normAutofit/>
-          </a:bodyPr>
-          <a:lstStyle>
-            <a:lvl1pPr marL="0" indent="0" algn="ctr" defTabSz="914400" rtl="0" eaLnBrk="1" latinLnBrk="0" hangingPunct="1">
-              <a:spcBef>
-                <a:spcPct val="20000"/>
-              </a:spcBef>
-              <a:buFont typeface="Arial" pitchFamily="34" charset="0"/>
-              <a:buNone/>
-              <a:defRPr sz="3200" kern="1200">
-                <a:solidFill>
-                  <a:schemeClr val="tx1">
-                    <a:tint val="75000"/>
-                  </a:schemeClr>
-                </a:solidFill>
-                <a:latin typeface="+mn-lt"/>
-                <a:ea typeface="+mn-ea"/>
-                <a:cs typeface="+mn-cs"/>
-              </a:defRPr>
-            </a:lvl1pPr>
-            <a:lvl2pPr marL="457200" indent="0" algn="ctr" defTabSz="914400" rtl="0" eaLnBrk="1" latinLnBrk="0" hangingPunct="1">
-              <a:spcBef>
-                <a:spcPct val="20000"/>
-              </a:spcBef>
-              <a:buFont typeface="Arial" pitchFamily="34" charset="0"/>
-              <a:buNone/>
-              <a:defRPr sz="2800" kern="1200">
-                <a:solidFill>
-                  <a:schemeClr val="tx1">
-                    <a:tint val="75000"/>
-                  </a:schemeClr>
-                </a:solidFill>
-                <a:latin typeface="+mn-lt"/>
-                <a:ea typeface="+mn-ea"/>
-                <a:cs typeface="+mn-cs"/>
-              </a:defRPr>
-            </a:lvl2pPr>
-            <a:lvl3pPr marL="914400" indent="0" algn="ctr" defTabSz="914400" rtl="0" eaLnBrk="1" latinLnBrk="0" hangingPunct="1">
-              <a:spcBef>
-                <a:spcPct val="20000"/>
-              </a:spcBef>
-              <a:buFont typeface="Arial" pitchFamily="34" charset="0"/>
-              <a:buNone/>
-              <a:defRPr sz="2400" kern="1200">
-                <a:solidFill>
-                  <a:schemeClr val="tx1">
-                    <a:tint val="75000"/>
-                  </a:schemeClr>
-                </a:solidFill>
-                <a:latin typeface="+mn-lt"/>
-                <a:ea typeface="+mn-ea"/>
-                <a:cs typeface="+mn-cs"/>
-              </a:defRPr>
-            </a:lvl3pPr>
-            <a:lvl4pPr marL="1371600" indent="0" algn="ctr" defTabSz="914400" rtl="0" eaLnBrk="1" latinLnBrk="0" hangingPunct="1">
-              <a:spcBef>
-                <a:spcPct val="20000"/>
-              </a:spcBef>
-              <a:buFont typeface="Arial" pitchFamily="34" charset="0"/>
-              <a:buNone/>
-              <a:defRPr sz="2000" kern="1200">
-                <a:solidFill>
-                  <a:schemeClr val="tx1">
-                    <a:tint val="75000"/>
-                  </a:schemeClr>
-                </a:solidFill>
-                <a:latin typeface="+mn-lt"/>
-                <a:ea typeface="+mn-ea"/>
-                <a:cs typeface="+mn-cs"/>
-              </a:defRPr>
-            </a:lvl4pPr>
-            <a:lvl5pPr marL="1828800" indent="0" algn="ctr" defTabSz="914400" rtl="0" eaLnBrk="1" latinLnBrk="0" hangingPunct="1">
-              <a:spcBef>
-                <a:spcPct val="20000"/>
-              </a:spcBef>
-              <a:buFont typeface="Arial" pitchFamily="34" charset="0"/>
-              <a:buNone/>
-              <a:defRPr sz="2000" kern="1200">
-                <a:solidFill>
-                  <a:schemeClr val="tx1">
-                    <a:tint val="75000"/>
-                  </a:schemeClr>
-                </a:solidFill>
-                <a:latin typeface="+mn-lt"/>
-                <a:ea typeface="+mn-ea"/>
-                <a:cs typeface="+mn-cs"/>
-              </a:defRPr>
-            </a:lvl5pPr>
-            <a:lvl6pPr marL="2286000" indent="0" algn="ctr" defTabSz="914400" rtl="0" eaLnBrk="1" latinLnBrk="0" hangingPunct="1">
-              <a:spcBef>
-                <a:spcPct val="20000"/>
-              </a:spcBef>
-              <a:buFont typeface="Arial" pitchFamily="34" charset="0"/>
-              <a:buNone/>
-              <a:defRPr sz="2000" kern="1200">
-                <a:solidFill>
-                  <a:schemeClr val="tx1">
-                    <a:tint val="75000"/>
-                  </a:schemeClr>
-                </a:solidFill>
-                <a:latin typeface="+mn-lt"/>
-                <a:ea typeface="+mn-ea"/>
-                <a:cs typeface="+mn-cs"/>
-              </a:defRPr>
-            </a:lvl6pPr>
-            <a:lvl7pPr marL="2743200" indent="0" algn="ctr" defTabSz="914400" rtl="0" eaLnBrk="1" latinLnBrk="0" hangingPunct="1">
-              <a:spcBef>
-                <a:spcPct val="20000"/>
-              </a:spcBef>
-              <a:buFont typeface="Arial" pitchFamily="34" charset="0"/>
-              <a:buNone/>
-              <a:defRPr sz="2000" kern="1200">
-                <a:solidFill>
-                  <a:schemeClr val="tx1">
-                    <a:tint val="75000"/>
-                  </a:schemeClr>
-                </a:solidFill>
-                <a:latin typeface="+mn-lt"/>
-                <a:ea typeface="+mn-ea"/>
-                <a:cs typeface="+mn-cs"/>
-              </a:defRPr>
-            </a:lvl7pPr>
-            <a:lvl8pPr marL="3200400" indent="0" algn="ctr" defTabSz="914400" rtl="0" eaLnBrk="1" latinLnBrk="0" hangingPunct="1">
-              <a:spcBef>
-                <a:spcPct val="20000"/>
-              </a:spcBef>
-              <a:buFont typeface="Arial" pitchFamily="34" charset="0"/>
-              <a:buNone/>
-              <a:defRPr sz="2000" kern="1200">
-                <a:solidFill>
-                  <a:schemeClr val="tx1">
-                    <a:tint val="75000"/>
-                  </a:schemeClr>
-                </a:solidFill>
-                <a:latin typeface="+mn-lt"/>
-                <a:ea typeface="+mn-ea"/>
-                <a:cs typeface="+mn-cs"/>
-              </a:defRPr>
-            </a:lvl8pPr>
-            <a:lvl9pPr marL="3657600" indent="0" algn="ctr" defTabSz="914400" rtl="0" eaLnBrk="1" latinLnBrk="0" hangingPunct="1">
-              <a:spcBef>
-                <a:spcPct val="20000"/>
-              </a:spcBef>
-              <a:buFont typeface="Arial" pitchFamily="34" charset="0"/>
-              <a:buNone/>
-              <a:defRPr sz="2000" kern="1200">
-                <a:solidFill>
-                  <a:schemeClr val="tx1">
-                    <a:tint val="75000"/>
-                  </a:schemeClr>
-                </a:solidFill>
-                <a:latin typeface="+mn-lt"/>
-                <a:ea typeface="+mn-ea"/>
-                <a:cs typeface="+mn-cs"/>
-              </a:defRPr>
-            </a:lvl9pPr>
-          </a:lstStyle>
-          <a:p>
-            <a:r>
-              <a:rPr lang="en-US" sz="1600" dirty="0">
-                <a:solidFill>
-                  <a:schemeClr val="tx1"/>
-                </a:solidFill>
-              </a:rPr>
-              <a:t>LEFT</a:t>
-            </a:r>
-          </a:p>
-        </p:txBody>
-      </p:sp>
-      <p:sp>
-        <p:nvSpPr>
-          <p:cNvPr id="14" name="Right Arrow 13">
-            <a:extLst>
-              <a:ext uri="{FF2B5EF4-FFF2-40B4-BE49-F238E27FC236}">
-                <a16:creationId xmlns:a16="http://schemas.microsoft.com/office/drawing/2014/main" id="{97214DF3-483F-0D4D-99B9-A4D1F523D806}"/>
-              </a:ext>
-            </a:extLst>
-          </p:cNvPr>
-          <p:cNvSpPr/>
-          <p:nvPr/>
-        </p:nvSpPr>
-        <p:spPr>
-          <a:xfrm rot="10800000">
-            <a:off x="1902125" y="6391827"/>
-            <a:ext cx="640200" cy="289763"/>
-          </a:xfrm>
-          <a:prstGeom prst="rightArrow">
-            <a:avLst/>
-          </a:prstGeom>
-          <a:solidFill>
-            <a:schemeClr val="tx1"/>
-          </a:solidFill>
-          <a:ln>
-            <a:noFill/>
-          </a:ln>
-        </p:spPr>
-        <p:style>
-          <a:lnRef idx="1">
-            <a:schemeClr val="accent1"/>
-          </a:lnRef>
-          <a:fillRef idx="3">
-            <a:schemeClr val="accent1"/>
-          </a:fillRef>
-          <a:effectRef idx="2">
             <a:schemeClr val="accent1"/>
           </a:effectRef>
           <a:fontRef idx="minor">
@@ -21087,6 +21178,36 @@
           </a:p>
         </p:txBody>
       </p:sp>
+      <p:pic>
+        <p:nvPicPr>
+          <p:cNvPr id="5" name="Picture 4" descr="Graphical user interface&#10;&#10;Description automatically generated with medium confidence">
+            <a:extLst>
+              <a:ext uri="{FF2B5EF4-FFF2-40B4-BE49-F238E27FC236}">
+                <a16:creationId xmlns:a16="http://schemas.microsoft.com/office/drawing/2014/main" id="{F6207476-8997-C24F-B039-6537CBB3F58A}"/>
+              </a:ext>
+            </a:extLst>
+          </p:cNvPr>
+          <p:cNvPicPr>
+            <a:picLocks noChangeAspect="1"/>
+          </p:cNvPicPr>
+          <p:nvPr/>
+        </p:nvPicPr>
+        <p:blipFill>
+          <a:blip r:embed="rId4"/>
+          <a:stretch>
+            <a:fillRect/>
+          </a:stretch>
+        </p:blipFill>
+        <p:spPr>
+          <a:xfrm>
+            <a:off x="7577357" y="3741526"/>
+            <a:ext cx="800871" cy="2302503"/>
+          </a:xfrm>
+          <a:prstGeom prst="rect">
+            <a:avLst/>
+          </a:prstGeom>
+        </p:spPr>
+      </p:pic>
     </p:spTree>
     <p:extLst>
       <p:ext uri="{BB962C8B-B14F-4D97-AF65-F5344CB8AC3E}">
@@ -21931,10 +22052,10 @@
       </p:sp>
       <p:pic>
         <p:nvPicPr>
-          <p:cNvPr id="5" name="Picture 4">
+          <p:cNvPr id="4" name="Picture 3" descr="Graphical user interface&#10;&#10;Description automatically generated">
             <a:extLst>
               <a:ext uri="{FF2B5EF4-FFF2-40B4-BE49-F238E27FC236}">
-                <a16:creationId xmlns:a16="http://schemas.microsoft.com/office/drawing/2014/main" id="{EE9B163A-D8D4-1249-B9F9-D9BFD6A928B2}"/>
+                <a16:creationId xmlns:a16="http://schemas.microsoft.com/office/drawing/2014/main" id="{FB9DFDF3-37AA-2849-B2C9-294BE9799373}"/>
               </a:ext>
             </a:extLst>
           </p:cNvPr>
@@ -21945,13 +22066,14 @@
         </p:nvPicPr>
         <p:blipFill>
           <a:blip r:embed="rId3"/>
-          <a:srcRect/>
-          <a:stretch/>
+          <a:stretch>
+            <a:fillRect/>
+          </a:stretch>
         </p:blipFill>
         <p:spPr>
           <a:xfrm>
-            <a:off x="3162435" y="3194203"/>
-            <a:ext cx="5977910" cy="2767301"/>
+            <a:off x="3393661" y="2843321"/>
+            <a:ext cx="5404678" cy="3230523"/>
           </a:xfrm>
           <a:prstGeom prst="rect">
             <a:avLst/>
@@ -22858,7 +22980,7 @@
         <p:spPr>
           <a:xfrm>
             <a:off x="1111170" y="583724"/>
-            <a:ext cx="10591879" cy="5013227"/>
+            <a:ext cx="10591879" cy="1684241"/>
           </a:xfrm>
           <a:ln>
             <a:noFill/>
@@ -23223,10 +23345,10 @@
       </p:sp>
       <p:pic>
         <p:nvPicPr>
-          <p:cNvPr id="9" name="Picture 8">
+          <p:cNvPr id="7" name="Picture 6" descr="A screenshot of a computer&#10;&#10;Description automatically generated with medium confidence">
             <a:extLst>
               <a:ext uri="{FF2B5EF4-FFF2-40B4-BE49-F238E27FC236}">
-                <a16:creationId xmlns:a16="http://schemas.microsoft.com/office/drawing/2014/main" id="{DEA315B9-3AE8-544C-BB4B-3F1CB88493DC}"/>
+                <a16:creationId xmlns:a16="http://schemas.microsoft.com/office/drawing/2014/main" id="{E4047BCC-0CEF-F247-99C0-54CABD55AD9F}"/>
               </a:ext>
             </a:extLst>
           </p:cNvPr>
@@ -23235,15 +23357,49 @@
           </p:cNvPicPr>
           <p:nvPr/>
         </p:nvPicPr>
-        <p:blipFill>
+        <p:blipFill rotWithShape="1">
           <a:blip r:embed="rId3"/>
-          <a:srcRect/>
+          <a:srcRect l="4826" t="13720" r="3988" b="6797"/>
           <a:stretch/>
         </p:blipFill>
         <p:spPr>
           <a:xfrm>
-            <a:off x="3628103" y="2361114"/>
-            <a:ext cx="4935794" cy="3441471"/>
+            <a:off x="1111170" y="2285445"/>
+            <a:ext cx="4989168" cy="3765430"/>
+          </a:xfrm>
+          <a:prstGeom prst="rect">
+            <a:avLst/>
+          </a:prstGeom>
+          <a:ln>
+            <a:solidFill>
+              <a:schemeClr val="tx1"/>
+            </a:solidFill>
+          </a:ln>
+        </p:spPr>
+      </p:pic>
+      <p:pic>
+        <p:nvPicPr>
+          <p:cNvPr id="10" name="Picture 9" descr="Graphical user interface, application&#10;&#10;Description automatically generated">
+            <a:extLst>
+              <a:ext uri="{FF2B5EF4-FFF2-40B4-BE49-F238E27FC236}">
+                <a16:creationId xmlns:a16="http://schemas.microsoft.com/office/drawing/2014/main" id="{C20F0546-775E-0E4D-B241-4681114DEA80}"/>
+              </a:ext>
+            </a:extLst>
+          </p:cNvPr>
+          <p:cNvPicPr>
+            <a:picLocks noChangeAspect="1"/>
+          </p:cNvPicPr>
+          <p:nvPr/>
+        </p:nvPicPr>
+        <p:blipFill rotWithShape="1">
+          <a:blip r:embed="rId4"/>
+          <a:srcRect l="4837" t="13393" r="4658" b="7053"/>
+          <a:stretch/>
+        </p:blipFill>
+        <p:spPr>
+          <a:xfrm>
+            <a:off x="6243635" y="2285445"/>
+            <a:ext cx="4955055" cy="3771341"/>
           </a:xfrm>
           <a:prstGeom prst="rect">
             <a:avLst/>
@@ -23933,13 +24089,13 @@
         </p:nvPicPr>
         <p:blipFill rotWithShape="1">
           <a:blip r:embed="rId3"/>
-          <a:srcRect l="5102" t="14169" r="4526" b="6636"/>
+          <a:srcRect l="4493" t="13352" r="4356" b="6685"/>
           <a:stretch/>
         </p:blipFill>
         <p:spPr>
           <a:xfrm>
-            <a:off x="3237400" y="1854981"/>
-            <a:ext cx="5717199" cy="4016353"/>
+            <a:off x="3459859" y="1781216"/>
+            <a:ext cx="5272281" cy="3944993"/>
           </a:xfrm>
           <a:prstGeom prst="rect">
             <a:avLst/>
@@ -23989,6 +24145,41 @@
           <a:chExt cx="0" cy="0"/>
         </a:xfrm>
       </p:grpSpPr>
+      <p:pic>
+        <p:nvPicPr>
+          <p:cNvPr id="10" name="Picture 9" descr="Graphical user interface, text, application, website&#10;&#10;Description automatically generated">
+            <a:extLst>
+              <a:ext uri="{FF2B5EF4-FFF2-40B4-BE49-F238E27FC236}">
+                <a16:creationId xmlns:a16="http://schemas.microsoft.com/office/drawing/2014/main" id="{1C00ED15-F850-334F-A26C-A63A46244643}"/>
+              </a:ext>
+            </a:extLst>
+          </p:cNvPr>
+          <p:cNvPicPr>
+            <a:picLocks noChangeAspect="1"/>
+          </p:cNvPicPr>
+          <p:nvPr/>
+        </p:nvPicPr>
+        <p:blipFill>
+          <a:blip r:embed="rId3"/>
+          <a:stretch>
+            <a:fillRect/>
+          </a:stretch>
+        </p:blipFill>
+        <p:spPr>
+          <a:xfrm>
+            <a:off x="2516010" y="2725024"/>
+            <a:ext cx="6935181" cy="1476397"/>
+          </a:xfrm>
+          <a:prstGeom prst="rect">
+            <a:avLst/>
+          </a:prstGeom>
+          <a:ln>
+            <a:solidFill>
+              <a:schemeClr val="tx1"/>
+            </a:solidFill>
+          </a:ln>
+        </p:spPr>
+      </p:pic>
       <p:sp>
         <p:nvSpPr>
           <p:cNvPr id="3" name="Content Placeholder 2"/>
@@ -24002,7 +24193,7 @@
         <p:spPr>
           <a:xfrm>
             <a:off x="1111170" y="583724"/>
-            <a:ext cx="10591879" cy="5013227"/>
+            <a:ext cx="10591879" cy="2106563"/>
           </a:xfrm>
           <a:ln>
             <a:noFill/>
@@ -24019,7 +24210,19 @@
             </a:pPr>
             <a:r>
               <a:rPr lang="en-US" dirty="0"/>
-              <a:t>For each </a:t>
+              <a:t>On a ‘</a:t>
+            </a:r>
+            <a:r>
+              <a:rPr lang="en-US" dirty="0">
+                <a:solidFill>
+                  <a:srgbClr val="00FDFF"/>
+                </a:solidFill>
+              </a:rPr>
+              <a:t>like</a:t>
+            </a:r>
+            <a:r>
+              <a:rPr lang="en-US" dirty="0"/>
+              <a:t>’ room, for each </a:t>
             </a:r>
             <a:r>
               <a:rPr lang="en-US" dirty="0">
@@ -24635,74 +24838,6 @@
           </a:p>
         </p:txBody>
       </p:sp>
-      <p:pic>
-        <p:nvPicPr>
-          <p:cNvPr id="9" name="Picture 8" descr="A screenshot of a computer&#10;&#10;Description automatically generated with medium confidence">
-            <a:extLst>
-              <a:ext uri="{FF2B5EF4-FFF2-40B4-BE49-F238E27FC236}">
-                <a16:creationId xmlns:a16="http://schemas.microsoft.com/office/drawing/2014/main" id="{39AECFE0-4DE0-A642-B84B-622F5F7928C9}"/>
-              </a:ext>
-            </a:extLst>
-          </p:cNvPr>
-          <p:cNvPicPr>
-            <a:picLocks noChangeAspect="1"/>
-          </p:cNvPicPr>
-          <p:nvPr/>
-        </p:nvPicPr>
-        <p:blipFill rotWithShape="1">
-          <a:blip r:embed="rId3"/>
-          <a:srcRect l="28990" t="25136" r="16970" b="67881"/>
-          <a:stretch/>
-        </p:blipFill>
-        <p:spPr>
-          <a:xfrm>
-            <a:off x="2542325" y="2690287"/>
-            <a:ext cx="6908866" cy="751241"/>
-          </a:xfrm>
-          <a:prstGeom prst="rect">
-            <a:avLst/>
-          </a:prstGeom>
-          <a:ln>
-            <a:solidFill>
-              <a:schemeClr val="tx1"/>
-            </a:solidFill>
-          </a:ln>
-        </p:spPr>
-      </p:pic>
-      <p:pic>
-        <p:nvPicPr>
-          <p:cNvPr id="11" name="Picture 10" descr="A screenshot of a computer&#10;&#10;Description automatically generated with medium confidence">
-            <a:extLst>
-              <a:ext uri="{FF2B5EF4-FFF2-40B4-BE49-F238E27FC236}">
-                <a16:creationId xmlns:a16="http://schemas.microsoft.com/office/drawing/2014/main" id="{D1E110C0-4239-7A4B-930B-CD80117D2CF9}"/>
-              </a:ext>
-            </a:extLst>
-          </p:cNvPr>
-          <p:cNvPicPr>
-            <a:picLocks noChangeAspect="1"/>
-          </p:cNvPicPr>
-          <p:nvPr/>
-        </p:nvPicPr>
-        <p:blipFill rotWithShape="1">
-          <a:blip r:embed="rId4"/>
-          <a:srcRect l="28635" t="31963" r="16724" b="61066"/>
-          <a:stretch/>
-        </p:blipFill>
-        <p:spPr>
-          <a:xfrm>
-            <a:off x="2542325" y="3459670"/>
-            <a:ext cx="6908866" cy="741751"/>
-          </a:xfrm>
-          <a:prstGeom prst="rect">
-            <a:avLst/>
-          </a:prstGeom>
-          <a:ln>
-            <a:solidFill>
-              <a:schemeClr val="tx1"/>
-            </a:solidFill>
-          </a:ln>
-        </p:spPr>
-      </p:pic>
     </p:spTree>
     <p:extLst>
       <p:ext uri="{BB962C8B-B14F-4D97-AF65-F5344CB8AC3E}">
@@ -24741,6 +24876,41 @@
           <a:chExt cx="0" cy="0"/>
         </a:xfrm>
       </p:grpSpPr>
+      <p:pic>
+        <p:nvPicPr>
+          <p:cNvPr id="10" name="Picture 9" descr="Graphical user interface, text, website&#10;&#10;Description automatically generated">
+            <a:extLst>
+              <a:ext uri="{FF2B5EF4-FFF2-40B4-BE49-F238E27FC236}">
+                <a16:creationId xmlns:a16="http://schemas.microsoft.com/office/drawing/2014/main" id="{504CECE9-672B-C34A-8B73-D52F705D73D1}"/>
+              </a:ext>
+            </a:extLst>
+          </p:cNvPr>
+          <p:cNvPicPr>
+            <a:picLocks noChangeAspect="1"/>
+          </p:cNvPicPr>
+          <p:nvPr/>
+        </p:nvPicPr>
+        <p:blipFill>
+          <a:blip r:embed="rId3"/>
+          <a:stretch>
+            <a:fillRect/>
+          </a:stretch>
+        </p:blipFill>
+        <p:spPr>
+          <a:xfrm>
+            <a:off x="2542325" y="2690287"/>
+            <a:ext cx="6908866" cy="1495306"/>
+          </a:xfrm>
+          <a:prstGeom prst="rect">
+            <a:avLst/>
+          </a:prstGeom>
+          <a:ln>
+            <a:solidFill>
+              <a:schemeClr val="tx1"/>
+            </a:solidFill>
+          </a:ln>
+        </p:spPr>
+      </p:pic>
       <p:sp>
         <p:nvSpPr>
           <p:cNvPr id="3" name="Content Placeholder 2"/>
@@ -24753,8 +24923,8 @@
         </p:nvSpPr>
         <p:spPr>
           <a:xfrm>
-            <a:off x="800060" y="712122"/>
-            <a:ext cx="10591879" cy="1884219"/>
+            <a:off x="1111170" y="583724"/>
+            <a:ext cx="10591879" cy="5013227"/>
           </a:xfrm>
           <a:ln>
             <a:noFill/>
@@ -24771,20 +24941,88 @@
             </a:pPr>
             <a:r>
               <a:rPr lang="en-US" dirty="0"/>
-              <a:t>We will just have you do this for two </a:t>
+              <a:t>On a ‘</a:t>
             </a:r>
             <a:r>
               <a:rPr lang="en-US" dirty="0">
                 <a:solidFill>
-                  <a:srgbClr val="00FF00"/>
+                  <a:srgbClr val="FF0000"/>
                 </a:solidFill>
               </a:rPr>
-              <a:t>chatrooms</a:t>
+              <a:t>dislike</a:t>
             </a:r>
             <a:r>
               <a:rPr lang="en-US" dirty="0"/>
-              <a:t> before you start playing as the one posting.</a:t>
-            </a:r>
+              <a:t>’ room, for each </a:t>
+            </a:r>
+            <a:r>
+              <a:rPr lang="en-US" dirty="0">
+                <a:solidFill>
+                  <a:srgbClr val="FFFF66"/>
+                </a:solidFill>
+              </a:rPr>
+              <a:t>post</a:t>
+            </a:r>
+            <a:r>
+              <a:rPr lang="en-US" dirty="0"/>
+              <a:t> you see:</a:t>
+            </a:r>
+          </a:p>
+          <a:p>
+            <a:pPr marL="0" indent="0">
+              <a:buNone/>
+            </a:pPr>
+            <a:r>
+              <a:rPr lang="en-US" dirty="0"/>
+              <a:t>Press the ‘&gt;’ KEY to </a:t>
+            </a:r>
+            <a:r>
+              <a:rPr lang="en-US" b="1" dirty="0"/>
+              <a:t>ADD</a:t>
+            </a:r>
+            <a:r>
+              <a:rPr lang="en-US" dirty="0"/>
+              <a:t> a </a:t>
+            </a:r>
+            <a:r>
+              <a:rPr lang="en-US" dirty="0">
+                <a:solidFill>
+                  <a:srgbClr val="FF0000"/>
+                </a:solidFill>
+              </a:rPr>
+              <a:t>dislike</a:t>
+            </a:r>
+            <a:r>
+              <a:rPr lang="en-US" dirty="0"/>
+              <a:t>.</a:t>
+            </a:r>
+          </a:p>
+          <a:p>
+            <a:pPr marL="0" indent="0">
+              <a:buNone/>
+            </a:pPr>
+            <a:r>
+              <a:rPr lang="en-US" dirty="0"/>
+              <a:t>Press the ‘&lt;‘ KEY if you don’t want to add a </a:t>
+            </a:r>
+            <a:r>
+              <a:rPr lang="en-US" dirty="0">
+                <a:solidFill>
+                  <a:srgbClr val="FF0000"/>
+                </a:solidFill>
+              </a:rPr>
+              <a:t>dislike</a:t>
+            </a:r>
+            <a:r>
+              <a:rPr lang="en-US" dirty="0"/>
+              <a:t>.</a:t>
+            </a:r>
+          </a:p>
+          <a:p>
+            <a:pPr marL="0" indent="0">
+              <a:buNone/>
+            </a:pPr>
+            <a:endParaRPr lang="en-US" dirty="0"/>
           </a:p>
         </p:txBody>
       </p:sp>
@@ -25092,7 +25330,7 @@
           <p:cNvPr id="7" name="Subtitle 8">
             <a:extLst>
               <a:ext uri="{FF2B5EF4-FFF2-40B4-BE49-F238E27FC236}">
-                <a16:creationId xmlns:a16="http://schemas.microsoft.com/office/drawing/2014/main" id="{8AFC28FF-E56E-C24A-ADF8-84A5C380A13A}"/>
+                <a16:creationId xmlns:a16="http://schemas.microsoft.com/office/drawing/2014/main" id="{4BDF4734-B63C-DF44-8671-1E43AFCD02DC}"/>
               </a:ext>
             </a:extLst>
           </p:cNvPr>
@@ -25286,7 +25524,7 @@
           <p:cNvPr id="8" name="Right Arrow 7">
             <a:extLst>
               <a:ext uri="{FF2B5EF4-FFF2-40B4-BE49-F238E27FC236}">
-                <a16:creationId xmlns:a16="http://schemas.microsoft.com/office/drawing/2014/main" id="{B2397E97-8CBC-1849-B93C-7FDE623F1693}"/>
+                <a16:creationId xmlns:a16="http://schemas.microsoft.com/office/drawing/2014/main" id="{8E22DF06-D6BE-AB44-B261-74815089D5A0}"/>
               </a:ext>
             </a:extLst>
           </p:cNvPr>
@@ -25331,12 +25569,640 @@
           </a:p>
         </p:txBody>
       </p:sp>
+    </p:spTree>
+    <p:extLst>
+      <p:ext uri="{BB962C8B-B14F-4D97-AF65-F5344CB8AC3E}">
+        <p14:creationId xmlns:p14="http://schemas.microsoft.com/office/powerpoint/2010/main" val="2265661277"/>
+      </p:ext>
+    </p:extLst>
+  </p:cSld>
+  <p:clrMapOvr>
+    <a:masterClrMapping/>
+  </p:clrMapOvr>
+</p:sld>
+</file>
+
+<file path=ppt/slides/slide32.xml><?xml version="1.0" encoding="utf-8"?>
+<p:sld xmlns:a="http://schemas.openxmlformats.org/drawingml/2006/main" xmlns:r="http://schemas.openxmlformats.org/officeDocument/2006/relationships" xmlns:p="http://schemas.openxmlformats.org/presentationml/2006/main">
+  <p:cSld>
+    <p:bg>
+      <p:bgPr>
+        <a:solidFill>
+          <a:schemeClr val="bg1"/>
+        </a:solidFill>
+        <a:effectLst/>
+      </p:bgPr>
+    </p:bg>
+    <p:spTree>
+      <p:nvGrpSpPr>
+        <p:cNvPr id="1" name=""/>
+        <p:cNvGrpSpPr/>
+        <p:nvPr/>
+      </p:nvGrpSpPr>
+      <p:grpSpPr>
+        <a:xfrm>
+          <a:off x="0" y="0"/>
+          <a:ext cx="0" cy="0"/>
+          <a:chOff x="0" y="0"/>
+          <a:chExt cx="0" cy="0"/>
+        </a:xfrm>
+      </p:grpSpPr>
+      <p:sp>
+        <p:nvSpPr>
+          <p:cNvPr id="3" name="Content Placeholder 2"/>
+          <p:cNvSpPr>
+            <a:spLocks noGrp="1"/>
+          </p:cNvSpPr>
+          <p:nvPr>
+            <p:ph idx="1"/>
+          </p:nvPr>
+        </p:nvSpPr>
+        <p:spPr>
+          <a:xfrm>
+            <a:off x="800060" y="712122"/>
+            <a:ext cx="10591879" cy="1884219"/>
+          </a:xfrm>
+          <a:ln>
+            <a:noFill/>
+          </a:ln>
+        </p:spPr>
+        <p:txBody>
+          <a:bodyPr>
+            <a:noAutofit/>
+          </a:bodyPr>
+          <a:lstStyle/>
+          <a:p>
+            <a:pPr marL="0" indent="0">
+              <a:buNone/>
+            </a:pPr>
+            <a:r>
+              <a:rPr lang="en-US" dirty="0"/>
+              <a:t>We will just have you do this for two </a:t>
+            </a:r>
+            <a:r>
+              <a:rPr lang="en-US" dirty="0">
+                <a:solidFill>
+                  <a:srgbClr val="00FF00"/>
+                </a:solidFill>
+              </a:rPr>
+              <a:t>chatrooms</a:t>
+            </a:r>
+            <a:r>
+              <a:rPr lang="en-US" dirty="0"/>
+              <a:t> before you start playing as the one posting.</a:t>
+            </a:r>
+          </a:p>
+        </p:txBody>
+      </p:sp>
+      <p:sp>
+        <p:nvSpPr>
+          <p:cNvPr id="4" name="Title 3">
+            <a:extLst>
+              <a:ext uri="{FF2B5EF4-FFF2-40B4-BE49-F238E27FC236}">
+                <a16:creationId xmlns:a16="http://schemas.microsoft.com/office/drawing/2014/main" id="{3A04687C-A569-2C46-9FC2-ADCBBB048C8E}"/>
+              </a:ext>
+            </a:extLst>
+          </p:cNvPr>
+          <p:cNvSpPr txBox="1">
+            <a:spLocks/>
+          </p:cNvSpPr>
+          <p:nvPr/>
+        </p:nvSpPr>
+        <p:spPr>
+          <a:xfrm>
+            <a:off x="1524000" y="6201295"/>
+            <a:ext cx="9149174" cy="656705"/>
+          </a:xfrm>
+          <a:prstGeom prst="rect">
+            <a:avLst/>
+          </a:prstGeom>
+        </p:spPr>
+        <p:txBody>
+          <a:bodyPr vert="horz" lIns="91440" tIns="45720" rIns="91440" bIns="45720" rtlCol="0" anchor="ctr">
+            <a:normAutofit/>
+          </a:bodyPr>
+          <a:lstStyle>
+            <a:lvl1pPr algn="ctr" defTabSz="914400" rtl="0" eaLnBrk="1" latinLnBrk="0" hangingPunct="1">
+              <a:spcBef>
+                <a:spcPct val="0"/>
+              </a:spcBef>
+              <a:buNone/>
+              <a:defRPr sz="4400" kern="1200">
+                <a:solidFill>
+                  <a:schemeClr val="tx1"/>
+                </a:solidFill>
+                <a:latin typeface="+mj-lt"/>
+                <a:ea typeface="+mj-ea"/>
+                <a:cs typeface="+mj-cs"/>
+              </a:defRPr>
+            </a:lvl1pPr>
+          </a:lstStyle>
+          <a:p>
+            <a:r>
+              <a:rPr lang="en-US" sz="3000" dirty="0">
+                <a:solidFill>
+                  <a:srgbClr val="FF0000"/>
+                </a:solidFill>
+              </a:rPr>
+              <a:t>PRESS THE RIGHT BUTTON TO CONTINUE</a:t>
+            </a:r>
+          </a:p>
+        </p:txBody>
+      </p:sp>
+      <p:sp>
+        <p:nvSpPr>
+          <p:cNvPr id="5" name="Subtitle 8">
+            <a:extLst>
+              <a:ext uri="{FF2B5EF4-FFF2-40B4-BE49-F238E27FC236}">
+                <a16:creationId xmlns:a16="http://schemas.microsoft.com/office/drawing/2014/main" id="{5385BA60-94EE-1D48-A0DD-23171E6645FB}"/>
+              </a:ext>
+            </a:extLst>
+          </p:cNvPr>
+          <p:cNvSpPr txBox="1">
+            <a:spLocks/>
+          </p:cNvSpPr>
+          <p:nvPr/>
+        </p:nvSpPr>
+        <p:spPr>
+          <a:xfrm>
+            <a:off x="9140345" y="6073844"/>
+            <a:ext cx="1532830" cy="801636"/>
+          </a:xfrm>
+          <a:prstGeom prst="rect">
+            <a:avLst/>
+          </a:prstGeom>
+        </p:spPr>
+        <p:txBody>
+          <a:bodyPr vert="horz" lIns="91440" tIns="45720" rIns="91440" bIns="45720" rtlCol="0">
+            <a:normAutofit/>
+          </a:bodyPr>
+          <a:lstStyle>
+            <a:lvl1pPr marL="0" indent="0" algn="ctr" defTabSz="914400" rtl="0" eaLnBrk="1" latinLnBrk="0" hangingPunct="1">
+              <a:spcBef>
+                <a:spcPct val="20000"/>
+              </a:spcBef>
+              <a:buFont typeface="Arial" pitchFamily="34" charset="0"/>
+              <a:buNone/>
+              <a:defRPr sz="3200" kern="1200">
+                <a:solidFill>
+                  <a:schemeClr val="tx1">
+                    <a:tint val="75000"/>
+                  </a:schemeClr>
+                </a:solidFill>
+                <a:latin typeface="+mn-lt"/>
+                <a:ea typeface="+mn-ea"/>
+                <a:cs typeface="+mn-cs"/>
+              </a:defRPr>
+            </a:lvl1pPr>
+            <a:lvl2pPr marL="457200" indent="0" algn="ctr" defTabSz="914400" rtl="0" eaLnBrk="1" latinLnBrk="0" hangingPunct="1">
+              <a:spcBef>
+                <a:spcPct val="20000"/>
+              </a:spcBef>
+              <a:buFont typeface="Arial" pitchFamily="34" charset="0"/>
+              <a:buNone/>
+              <a:defRPr sz="2800" kern="1200">
+                <a:solidFill>
+                  <a:schemeClr val="tx1">
+                    <a:tint val="75000"/>
+                  </a:schemeClr>
+                </a:solidFill>
+                <a:latin typeface="+mn-lt"/>
+                <a:ea typeface="+mn-ea"/>
+                <a:cs typeface="+mn-cs"/>
+              </a:defRPr>
+            </a:lvl2pPr>
+            <a:lvl3pPr marL="914400" indent="0" algn="ctr" defTabSz="914400" rtl="0" eaLnBrk="1" latinLnBrk="0" hangingPunct="1">
+              <a:spcBef>
+                <a:spcPct val="20000"/>
+              </a:spcBef>
+              <a:buFont typeface="Arial" pitchFamily="34" charset="0"/>
+              <a:buNone/>
+              <a:defRPr sz="2400" kern="1200">
+                <a:solidFill>
+                  <a:schemeClr val="tx1">
+                    <a:tint val="75000"/>
+                  </a:schemeClr>
+                </a:solidFill>
+                <a:latin typeface="+mn-lt"/>
+                <a:ea typeface="+mn-ea"/>
+                <a:cs typeface="+mn-cs"/>
+              </a:defRPr>
+            </a:lvl3pPr>
+            <a:lvl4pPr marL="1371600" indent="0" algn="ctr" defTabSz="914400" rtl="0" eaLnBrk="1" latinLnBrk="0" hangingPunct="1">
+              <a:spcBef>
+                <a:spcPct val="20000"/>
+              </a:spcBef>
+              <a:buFont typeface="Arial" pitchFamily="34" charset="0"/>
+              <a:buNone/>
+              <a:defRPr sz="2000" kern="1200">
+                <a:solidFill>
+                  <a:schemeClr val="tx1">
+                    <a:tint val="75000"/>
+                  </a:schemeClr>
+                </a:solidFill>
+                <a:latin typeface="+mn-lt"/>
+                <a:ea typeface="+mn-ea"/>
+                <a:cs typeface="+mn-cs"/>
+              </a:defRPr>
+            </a:lvl4pPr>
+            <a:lvl5pPr marL="1828800" indent="0" algn="ctr" defTabSz="914400" rtl="0" eaLnBrk="1" latinLnBrk="0" hangingPunct="1">
+              <a:spcBef>
+                <a:spcPct val="20000"/>
+              </a:spcBef>
+              <a:buFont typeface="Arial" pitchFamily="34" charset="0"/>
+              <a:buNone/>
+              <a:defRPr sz="2000" kern="1200">
+                <a:solidFill>
+                  <a:schemeClr val="tx1">
+                    <a:tint val="75000"/>
+                  </a:schemeClr>
+                </a:solidFill>
+                <a:latin typeface="+mn-lt"/>
+                <a:ea typeface="+mn-ea"/>
+                <a:cs typeface="+mn-cs"/>
+              </a:defRPr>
+            </a:lvl5pPr>
+            <a:lvl6pPr marL="2286000" indent="0" algn="ctr" defTabSz="914400" rtl="0" eaLnBrk="1" latinLnBrk="0" hangingPunct="1">
+              <a:spcBef>
+                <a:spcPct val="20000"/>
+              </a:spcBef>
+              <a:buFont typeface="Arial" pitchFamily="34" charset="0"/>
+              <a:buNone/>
+              <a:defRPr sz="2000" kern="1200">
+                <a:solidFill>
+                  <a:schemeClr val="tx1">
+                    <a:tint val="75000"/>
+                  </a:schemeClr>
+                </a:solidFill>
+                <a:latin typeface="+mn-lt"/>
+                <a:ea typeface="+mn-ea"/>
+                <a:cs typeface="+mn-cs"/>
+              </a:defRPr>
+            </a:lvl6pPr>
+            <a:lvl7pPr marL="2743200" indent="0" algn="ctr" defTabSz="914400" rtl="0" eaLnBrk="1" latinLnBrk="0" hangingPunct="1">
+              <a:spcBef>
+                <a:spcPct val="20000"/>
+              </a:spcBef>
+              <a:buFont typeface="Arial" pitchFamily="34" charset="0"/>
+              <a:buNone/>
+              <a:defRPr sz="2000" kern="1200">
+                <a:solidFill>
+                  <a:schemeClr val="tx1">
+                    <a:tint val="75000"/>
+                  </a:schemeClr>
+                </a:solidFill>
+                <a:latin typeface="+mn-lt"/>
+                <a:ea typeface="+mn-ea"/>
+                <a:cs typeface="+mn-cs"/>
+              </a:defRPr>
+            </a:lvl7pPr>
+            <a:lvl8pPr marL="3200400" indent="0" algn="ctr" defTabSz="914400" rtl="0" eaLnBrk="1" latinLnBrk="0" hangingPunct="1">
+              <a:spcBef>
+                <a:spcPct val="20000"/>
+              </a:spcBef>
+              <a:buFont typeface="Arial" pitchFamily="34" charset="0"/>
+              <a:buNone/>
+              <a:defRPr sz="2000" kern="1200">
+                <a:solidFill>
+                  <a:schemeClr val="tx1">
+                    <a:tint val="75000"/>
+                  </a:schemeClr>
+                </a:solidFill>
+                <a:latin typeface="+mn-lt"/>
+                <a:ea typeface="+mn-ea"/>
+                <a:cs typeface="+mn-cs"/>
+              </a:defRPr>
+            </a:lvl8pPr>
+            <a:lvl9pPr marL="3657600" indent="0" algn="ctr" defTabSz="914400" rtl="0" eaLnBrk="1" latinLnBrk="0" hangingPunct="1">
+              <a:spcBef>
+                <a:spcPct val="20000"/>
+              </a:spcBef>
+              <a:buFont typeface="Arial" pitchFamily="34" charset="0"/>
+              <a:buNone/>
+              <a:defRPr sz="2000" kern="1200">
+                <a:solidFill>
+                  <a:schemeClr val="tx1">
+                    <a:tint val="75000"/>
+                  </a:schemeClr>
+                </a:solidFill>
+                <a:latin typeface="+mn-lt"/>
+                <a:ea typeface="+mn-ea"/>
+                <a:cs typeface="+mn-cs"/>
+              </a:defRPr>
+            </a:lvl9pPr>
+          </a:lstStyle>
+          <a:p>
+            <a:r>
+              <a:rPr lang="en-US" sz="1600" dirty="0">
+                <a:solidFill>
+                  <a:schemeClr val="tx1"/>
+                </a:solidFill>
+              </a:rPr>
+              <a:t>RIGHT</a:t>
+            </a:r>
+          </a:p>
+        </p:txBody>
+      </p:sp>
+      <p:sp>
+        <p:nvSpPr>
+          <p:cNvPr id="6" name="Right Arrow 5">
+            <a:extLst>
+              <a:ext uri="{FF2B5EF4-FFF2-40B4-BE49-F238E27FC236}">
+                <a16:creationId xmlns:a16="http://schemas.microsoft.com/office/drawing/2014/main" id="{E505ED16-B2E8-4140-B53D-56027D0A90C5}"/>
+              </a:ext>
+            </a:extLst>
+          </p:cNvPr>
+          <p:cNvSpPr/>
+          <p:nvPr/>
+        </p:nvSpPr>
+        <p:spPr>
+          <a:xfrm>
+            <a:off x="9637318" y="6391827"/>
+            <a:ext cx="640200" cy="289763"/>
+          </a:xfrm>
+          <a:prstGeom prst="rightArrow">
+            <a:avLst/>
+          </a:prstGeom>
+          <a:solidFill>
+            <a:schemeClr val="tx1"/>
+          </a:solidFill>
+          <a:ln>
+            <a:noFill/>
+          </a:ln>
+        </p:spPr>
+        <p:style>
+          <a:lnRef idx="1">
+            <a:schemeClr val="accent1"/>
+          </a:lnRef>
+          <a:fillRef idx="3">
+            <a:schemeClr val="accent1"/>
+          </a:fillRef>
+          <a:effectRef idx="2">
+            <a:schemeClr val="accent1"/>
+          </a:effectRef>
+          <a:fontRef idx="minor">
+            <a:schemeClr val="lt1"/>
+          </a:fontRef>
+        </p:style>
+        <p:txBody>
+          <a:bodyPr rtlCol="0" anchor="ctr"/>
+          <a:lstStyle/>
+          <a:p>
+            <a:pPr algn="ctr"/>
+            <a:endParaRPr lang="en-US"/>
+          </a:p>
+        </p:txBody>
+      </p:sp>
+      <p:sp>
+        <p:nvSpPr>
+          <p:cNvPr id="7" name="Subtitle 8">
+            <a:extLst>
+              <a:ext uri="{FF2B5EF4-FFF2-40B4-BE49-F238E27FC236}">
+                <a16:creationId xmlns:a16="http://schemas.microsoft.com/office/drawing/2014/main" id="{8AFC28FF-E56E-C24A-ADF8-84A5C380A13A}"/>
+              </a:ext>
+            </a:extLst>
+          </p:cNvPr>
+          <p:cNvSpPr txBox="1">
+            <a:spLocks/>
+          </p:cNvSpPr>
+          <p:nvPr/>
+        </p:nvSpPr>
+        <p:spPr>
+          <a:xfrm>
+            <a:off x="1518826" y="6073844"/>
+            <a:ext cx="1532830" cy="801636"/>
+          </a:xfrm>
+          <a:prstGeom prst="rect">
+            <a:avLst/>
+          </a:prstGeom>
+        </p:spPr>
+        <p:txBody>
+          <a:bodyPr vert="horz" lIns="91440" tIns="45720" rIns="91440" bIns="45720" rtlCol="0">
+            <a:normAutofit/>
+          </a:bodyPr>
+          <a:lstStyle>
+            <a:lvl1pPr marL="0" indent="0" algn="ctr" defTabSz="914400" rtl="0" eaLnBrk="1" latinLnBrk="0" hangingPunct="1">
+              <a:spcBef>
+                <a:spcPct val="20000"/>
+              </a:spcBef>
+              <a:buFont typeface="Arial" pitchFamily="34" charset="0"/>
+              <a:buNone/>
+              <a:defRPr sz="3200" kern="1200">
+                <a:solidFill>
+                  <a:schemeClr val="tx1">
+                    <a:tint val="75000"/>
+                  </a:schemeClr>
+                </a:solidFill>
+                <a:latin typeface="+mn-lt"/>
+                <a:ea typeface="+mn-ea"/>
+                <a:cs typeface="+mn-cs"/>
+              </a:defRPr>
+            </a:lvl1pPr>
+            <a:lvl2pPr marL="457200" indent="0" algn="ctr" defTabSz="914400" rtl="0" eaLnBrk="1" latinLnBrk="0" hangingPunct="1">
+              <a:spcBef>
+                <a:spcPct val="20000"/>
+              </a:spcBef>
+              <a:buFont typeface="Arial" pitchFamily="34" charset="0"/>
+              <a:buNone/>
+              <a:defRPr sz="2800" kern="1200">
+                <a:solidFill>
+                  <a:schemeClr val="tx1">
+                    <a:tint val="75000"/>
+                  </a:schemeClr>
+                </a:solidFill>
+                <a:latin typeface="+mn-lt"/>
+                <a:ea typeface="+mn-ea"/>
+                <a:cs typeface="+mn-cs"/>
+              </a:defRPr>
+            </a:lvl2pPr>
+            <a:lvl3pPr marL="914400" indent="0" algn="ctr" defTabSz="914400" rtl="0" eaLnBrk="1" latinLnBrk="0" hangingPunct="1">
+              <a:spcBef>
+                <a:spcPct val="20000"/>
+              </a:spcBef>
+              <a:buFont typeface="Arial" pitchFamily="34" charset="0"/>
+              <a:buNone/>
+              <a:defRPr sz="2400" kern="1200">
+                <a:solidFill>
+                  <a:schemeClr val="tx1">
+                    <a:tint val="75000"/>
+                  </a:schemeClr>
+                </a:solidFill>
+                <a:latin typeface="+mn-lt"/>
+                <a:ea typeface="+mn-ea"/>
+                <a:cs typeface="+mn-cs"/>
+              </a:defRPr>
+            </a:lvl3pPr>
+            <a:lvl4pPr marL="1371600" indent="0" algn="ctr" defTabSz="914400" rtl="0" eaLnBrk="1" latinLnBrk="0" hangingPunct="1">
+              <a:spcBef>
+                <a:spcPct val="20000"/>
+              </a:spcBef>
+              <a:buFont typeface="Arial" pitchFamily="34" charset="0"/>
+              <a:buNone/>
+              <a:defRPr sz="2000" kern="1200">
+                <a:solidFill>
+                  <a:schemeClr val="tx1">
+                    <a:tint val="75000"/>
+                  </a:schemeClr>
+                </a:solidFill>
+                <a:latin typeface="+mn-lt"/>
+                <a:ea typeface="+mn-ea"/>
+                <a:cs typeface="+mn-cs"/>
+              </a:defRPr>
+            </a:lvl4pPr>
+            <a:lvl5pPr marL="1828800" indent="0" algn="ctr" defTabSz="914400" rtl="0" eaLnBrk="1" latinLnBrk="0" hangingPunct="1">
+              <a:spcBef>
+                <a:spcPct val="20000"/>
+              </a:spcBef>
+              <a:buFont typeface="Arial" pitchFamily="34" charset="0"/>
+              <a:buNone/>
+              <a:defRPr sz="2000" kern="1200">
+                <a:solidFill>
+                  <a:schemeClr val="tx1">
+                    <a:tint val="75000"/>
+                  </a:schemeClr>
+                </a:solidFill>
+                <a:latin typeface="+mn-lt"/>
+                <a:ea typeface="+mn-ea"/>
+                <a:cs typeface="+mn-cs"/>
+              </a:defRPr>
+            </a:lvl5pPr>
+            <a:lvl6pPr marL="2286000" indent="0" algn="ctr" defTabSz="914400" rtl="0" eaLnBrk="1" latinLnBrk="0" hangingPunct="1">
+              <a:spcBef>
+                <a:spcPct val="20000"/>
+              </a:spcBef>
+              <a:buFont typeface="Arial" pitchFamily="34" charset="0"/>
+              <a:buNone/>
+              <a:defRPr sz="2000" kern="1200">
+                <a:solidFill>
+                  <a:schemeClr val="tx1">
+                    <a:tint val="75000"/>
+                  </a:schemeClr>
+                </a:solidFill>
+                <a:latin typeface="+mn-lt"/>
+                <a:ea typeface="+mn-ea"/>
+                <a:cs typeface="+mn-cs"/>
+              </a:defRPr>
+            </a:lvl6pPr>
+            <a:lvl7pPr marL="2743200" indent="0" algn="ctr" defTabSz="914400" rtl="0" eaLnBrk="1" latinLnBrk="0" hangingPunct="1">
+              <a:spcBef>
+                <a:spcPct val="20000"/>
+              </a:spcBef>
+              <a:buFont typeface="Arial" pitchFamily="34" charset="0"/>
+              <a:buNone/>
+              <a:defRPr sz="2000" kern="1200">
+                <a:solidFill>
+                  <a:schemeClr val="tx1">
+                    <a:tint val="75000"/>
+                  </a:schemeClr>
+                </a:solidFill>
+                <a:latin typeface="+mn-lt"/>
+                <a:ea typeface="+mn-ea"/>
+                <a:cs typeface="+mn-cs"/>
+              </a:defRPr>
+            </a:lvl7pPr>
+            <a:lvl8pPr marL="3200400" indent="0" algn="ctr" defTabSz="914400" rtl="0" eaLnBrk="1" latinLnBrk="0" hangingPunct="1">
+              <a:spcBef>
+                <a:spcPct val="20000"/>
+              </a:spcBef>
+              <a:buFont typeface="Arial" pitchFamily="34" charset="0"/>
+              <a:buNone/>
+              <a:defRPr sz="2000" kern="1200">
+                <a:solidFill>
+                  <a:schemeClr val="tx1">
+                    <a:tint val="75000"/>
+                  </a:schemeClr>
+                </a:solidFill>
+                <a:latin typeface="+mn-lt"/>
+                <a:ea typeface="+mn-ea"/>
+                <a:cs typeface="+mn-cs"/>
+              </a:defRPr>
+            </a:lvl8pPr>
+            <a:lvl9pPr marL="3657600" indent="0" algn="ctr" defTabSz="914400" rtl="0" eaLnBrk="1" latinLnBrk="0" hangingPunct="1">
+              <a:spcBef>
+                <a:spcPct val="20000"/>
+              </a:spcBef>
+              <a:buFont typeface="Arial" pitchFamily="34" charset="0"/>
+              <a:buNone/>
+              <a:defRPr sz="2000" kern="1200">
+                <a:solidFill>
+                  <a:schemeClr val="tx1">
+                    <a:tint val="75000"/>
+                  </a:schemeClr>
+                </a:solidFill>
+                <a:latin typeface="+mn-lt"/>
+                <a:ea typeface="+mn-ea"/>
+                <a:cs typeface="+mn-cs"/>
+              </a:defRPr>
+            </a:lvl9pPr>
+          </a:lstStyle>
+          <a:p>
+            <a:r>
+              <a:rPr lang="en-US" sz="1600" dirty="0">
+                <a:solidFill>
+                  <a:schemeClr val="tx1"/>
+                </a:solidFill>
+              </a:rPr>
+              <a:t>LEFT</a:t>
+            </a:r>
+          </a:p>
+        </p:txBody>
+      </p:sp>
+      <p:sp>
+        <p:nvSpPr>
+          <p:cNvPr id="8" name="Right Arrow 7">
+            <a:extLst>
+              <a:ext uri="{FF2B5EF4-FFF2-40B4-BE49-F238E27FC236}">
+                <a16:creationId xmlns:a16="http://schemas.microsoft.com/office/drawing/2014/main" id="{B2397E97-8CBC-1849-B93C-7FDE623F1693}"/>
+              </a:ext>
+            </a:extLst>
+          </p:cNvPr>
+          <p:cNvSpPr/>
+          <p:nvPr/>
+        </p:nvSpPr>
+        <p:spPr>
+          <a:xfrm rot="10800000">
+            <a:off x="1902125" y="6391827"/>
+            <a:ext cx="640200" cy="289763"/>
+          </a:xfrm>
+          <a:prstGeom prst="rightArrow">
+            <a:avLst/>
+          </a:prstGeom>
+          <a:solidFill>
+            <a:schemeClr val="tx1"/>
+          </a:solidFill>
+          <a:ln>
+            <a:noFill/>
+          </a:ln>
+        </p:spPr>
+        <p:style>
+          <a:lnRef idx="1">
+            <a:schemeClr val="accent1"/>
+          </a:lnRef>
+          <a:fillRef idx="3">
+            <a:schemeClr val="accent1"/>
+          </a:fillRef>
+          <a:effectRef idx="2">
+            <a:schemeClr val="accent1"/>
+          </a:effectRef>
+          <a:fontRef idx="minor">
+            <a:schemeClr val="lt1"/>
+          </a:fontRef>
+        </p:style>
+        <p:txBody>
+          <a:bodyPr rtlCol="0" anchor="ctr"/>
+          <a:lstStyle/>
+          <a:p>
+            <a:pPr algn="ctr"/>
+            <a:endParaRPr lang="en-US"/>
+          </a:p>
+        </p:txBody>
+      </p:sp>
       <p:pic>
         <p:nvPicPr>
-          <p:cNvPr id="9" name="Picture 8" descr="Graphical user interface, text, application, email&#10;&#10;Description automatically generated">
+          <p:cNvPr id="11" name="Picture 10" descr="Graphical user interface, text, website&#10;&#10;Description automatically generated">
             <a:extLst>
               <a:ext uri="{FF2B5EF4-FFF2-40B4-BE49-F238E27FC236}">
-                <a16:creationId xmlns:a16="http://schemas.microsoft.com/office/drawing/2014/main" id="{3E74C630-076E-164C-B4FC-70070247FBBD}"/>
+                <a16:creationId xmlns:a16="http://schemas.microsoft.com/office/drawing/2014/main" id="{390FFF44-2405-C540-9E0A-8EE75E7E832A}"/>
               </a:ext>
             </a:extLst>
           </p:cNvPr>
@@ -25345,15 +26211,16 @@
           </p:cNvPicPr>
           <p:nvPr/>
         </p:nvPicPr>
-        <p:blipFill rotWithShape="1">
+        <p:blipFill>
           <a:blip r:embed="rId3"/>
-          <a:srcRect l="562" r="688" b="3660"/>
-          <a:stretch/>
+          <a:stretch>
+            <a:fillRect/>
+          </a:stretch>
         </p:blipFill>
         <p:spPr>
           <a:xfrm>
-            <a:off x="2542325" y="4201421"/>
-            <a:ext cx="6908866" cy="1435704"/>
+            <a:off x="6096000" y="2706667"/>
+            <a:ext cx="4289628" cy="928417"/>
           </a:xfrm>
           <a:prstGeom prst="rect">
             <a:avLst/>
@@ -25367,10 +26234,10 @@
       </p:pic>
       <p:pic>
         <p:nvPicPr>
-          <p:cNvPr id="12" name="Picture 11" descr="A screenshot of a computer&#10;&#10;Description automatically generated with medium confidence">
+          <p:cNvPr id="14" name="Picture 13" descr="Graphical user interface, text, application, website&#10;&#10;Description automatically generated">
             <a:extLst>
               <a:ext uri="{FF2B5EF4-FFF2-40B4-BE49-F238E27FC236}">
-                <a16:creationId xmlns:a16="http://schemas.microsoft.com/office/drawing/2014/main" id="{F097A60F-26F5-B749-A5F7-F3369D5DC5A1}"/>
+                <a16:creationId xmlns:a16="http://schemas.microsoft.com/office/drawing/2014/main" id="{D4B9E8B3-EAC4-A745-8174-F5A3BA3CA8B6}"/>
               </a:ext>
             </a:extLst>
           </p:cNvPr>
@@ -25379,49 +26246,16 @@
           </p:cNvPicPr>
           <p:nvPr/>
         </p:nvPicPr>
-        <p:blipFill rotWithShape="1">
+        <p:blipFill>
           <a:blip r:embed="rId4"/>
-          <a:srcRect l="28990" t="25136" r="16970" b="67881"/>
-          <a:stretch/>
+          <a:stretch>
+            <a:fillRect/>
+          </a:stretch>
         </p:blipFill>
         <p:spPr>
           <a:xfrm>
-            <a:off x="2542325" y="2690287"/>
-            <a:ext cx="6908866" cy="751241"/>
-          </a:xfrm>
-          <a:prstGeom prst="rect">
-            <a:avLst/>
-          </a:prstGeom>
-          <a:ln>
-            <a:solidFill>
-              <a:schemeClr val="tx1"/>
-            </a:solidFill>
-          </a:ln>
-        </p:spPr>
-      </p:pic>
-      <p:pic>
-        <p:nvPicPr>
-          <p:cNvPr id="13" name="Picture 12" descr="A screenshot of a computer&#10;&#10;Description automatically generated with medium confidence">
-            <a:extLst>
-              <a:ext uri="{FF2B5EF4-FFF2-40B4-BE49-F238E27FC236}">
-                <a16:creationId xmlns:a16="http://schemas.microsoft.com/office/drawing/2014/main" id="{97AF40FF-A4D7-E54A-9360-653E5107896A}"/>
-              </a:ext>
-            </a:extLst>
-          </p:cNvPr>
-          <p:cNvPicPr>
-            <a:picLocks noChangeAspect="1"/>
-          </p:cNvPicPr>
-          <p:nvPr/>
-        </p:nvPicPr>
-        <p:blipFill rotWithShape="1">
-          <a:blip r:embed="rId5"/>
-          <a:srcRect l="28635" t="31963" r="16724" b="61066"/>
-          <a:stretch/>
-        </p:blipFill>
-        <p:spPr>
-          <a:xfrm>
-            <a:off x="2542325" y="3459670"/>
-            <a:ext cx="6908866" cy="741751"/>
+            <a:off x="1190888" y="2706667"/>
+            <a:ext cx="4361118" cy="928417"/>
           </a:xfrm>
           <a:prstGeom prst="rect">
             <a:avLst/>
@@ -25446,7 +26280,7 @@
 </p:sld>
 </file>
 
-<file path=ppt/slides/slide32.xml><?xml version="1.0" encoding="utf-8"?>
+<file path=ppt/slides/slide33.xml><?xml version="1.0" encoding="utf-8"?>
 <p:sld xmlns:a="http://schemas.openxmlformats.org/drawingml/2006/main" xmlns:r="http://schemas.openxmlformats.org/officeDocument/2006/relationships" xmlns:p="http://schemas.openxmlformats.org/presentationml/2006/main">
   <p:cSld>
     <p:bg>
@@ -26466,13 +27300,13 @@
         </p:nvPicPr>
         <p:blipFill rotWithShape="1">
           <a:blip r:embed="rId3"/>
-          <a:srcRect l="4291" t="14052" r="4304" b="7251"/>
+          <a:srcRect l="5361" t="12799" r="4119" b="6674"/>
           <a:stretch/>
         </p:blipFill>
         <p:spPr>
           <a:xfrm>
-            <a:off x="1083411" y="2580954"/>
-            <a:ext cx="4465556" cy="3082139"/>
+            <a:off x="1138345" y="2502518"/>
+            <a:ext cx="4157136" cy="3202118"/>
           </a:xfrm>
           <a:prstGeom prst="rect">
             <a:avLst/>
@@ -26486,10 +27320,10 @@
       </p:pic>
       <p:pic>
         <p:nvPicPr>
-          <p:cNvPr id="16" name="Picture 15">
+          <p:cNvPr id="15" name="Picture 14">
             <a:extLst>
               <a:ext uri="{FF2B5EF4-FFF2-40B4-BE49-F238E27FC236}">
-                <a16:creationId xmlns:a16="http://schemas.microsoft.com/office/drawing/2014/main" id="{9C78F390-3B09-6D42-88EC-C67D2DC6BB4A}"/>
+                <a16:creationId xmlns:a16="http://schemas.microsoft.com/office/drawing/2014/main" id="{5C0880DC-C746-4843-BB20-649B05752FA1}"/>
               </a:ext>
             </a:extLst>
           </p:cNvPr>
@@ -26500,13 +27334,13 @@
         </p:nvPicPr>
         <p:blipFill rotWithShape="1">
           <a:blip r:embed="rId4"/>
-          <a:srcRect l="5102" t="14169" r="4526" b="6636"/>
+          <a:srcRect l="4493" t="13352" r="4356" b="6685"/>
           <a:stretch/>
         </p:blipFill>
         <p:spPr>
           <a:xfrm>
-            <a:off x="6285809" y="2580953"/>
-            <a:ext cx="4387365" cy="3082140"/>
+            <a:off x="5897681" y="2503425"/>
+            <a:ext cx="4222733" cy="3159667"/>
           </a:xfrm>
           <a:prstGeom prst="rect">
             <a:avLst/>

</xml_diff>

<commit_message>
added instruction audio for social media task
</commit_message>
<xml_diff>
--- a/public/js/tasks/social_media/media/Social_media_task_instructions_07_08_2022.pptx
+++ b/public/js/tasks/social_media/media/Social_media_task_instructions_07_08_2022.pptx
@@ -15733,12 +15733,6 @@
             </a:r>
           </a:p>
           <a:p>
-            <a:pPr marL="0" indent="0">
-              <a:buNone/>
-            </a:pPr>
-            <a:endParaRPr lang="en-US" dirty="0"/>
-          </a:p>
-          <a:p>
             <a:pPr marL="0" indent="0" algn="ctr">
               <a:buNone/>
             </a:pPr>
@@ -30259,7 +30253,7 @@
             </a:pPr>
             <a:r>
               <a:rPr lang="en-US" sz="2400" dirty="0"/>
-              <a:t>You job is to figure out what the people in the </a:t>
+              <a:t>Your job is to figure out what the people in the </a:t>
             </a:r>
             <a:r>
               <a:rPr lang="en-US" sz="2400" dirty="0">

</xml_diff>